<commit_message>
first update for fall 2020
</commit_message>
<xml_diff>
--- a/M03-processing.pptx
+++ b/M03-processing.pptx
@@ -251,7 +251,7 @@
           <a:p>
             <a:fld id="{7DF0156D-DEB9-0441-B5A8-0F3CD2EF97E7}" type="datetimeFigureOut">
               <a:rPr lang="en-US" smtClean="0"/>
-              <a:t>7/25/19</a:t>
+              <a:t>8/10/20</a:t>
             </a:fld>
             <a:endParaRPr lang="en-US"/>
           </a:p>
@@ -990,7 +990,7 @@
           </a:ln>
           <a:extLst>
             <a:ext uri="{909E8E84-426E-40dd-AFC4-6F175D3DCCD1}">
-              <a14:hiddenFill xmlns="" xmlns:a14="http://schemas.microsoft.com/office/drawing/2010/main">
+              <a14:hiddenFill xmlns:a14="http://schemas.microsoft.com/office/drawing/2010/main" xmlns="">
                 <a:solidFill>
                   <a:srgbClr val="FFFFFF"/>
                 </a:solidFill>
@@ -1036,7 +1036,7 @@
           </a:ln>
           <a:extLst>
             <a:ext uri="{909E8E84-426E-40dd-AFC4-6F175D3DCCD1}">
-              <a14:hiddenFill xmlns="" xmlns:a14="http://schemas.microsoft.com/office/drawing/2010/main">
+              <a14:hiddenFill xmlns:a14="http://schemas.microsoft.com/office/drawing/2010/main" xmlns="">
                 <a:solidFill>
                   <a:srgbClr val="FFFFFF"/>
                 </a:solidFill>
@@ -1082,7 +1082,7 @@
           </a:ln>
           <a:extLst>
             <a:ext uri="{909E8E84-426E-40dd-AFC4-6F175D3DCCD1}">
-              <a14:hiddenFill xmlns="" xmlns:a14="http://schemas.microsoft.com/office/drawing/2010/main">
+              <a14:hiddenFill xmlns:a14="http://schemas.microsoft.com/office/drawing/2010/main" xmlns="">
                 <a:solidFill>
                   <a:srgbClr val="FFFFFF"/>
                 </a:solidFill>
@@ -1126,7 +1126,7 @@
           </a:ln>
           <a:extLst>
             <a:ext uri="{909E8E84-426E-40dd-AFC4-6F175D3DCCD1}">
-              <a14:hiddenFill xmlns="" xmlns:a14="http://schemas.microsoft.com/office/drawing/2010/main">
+              <a14:hiddenFill xmlns:a14="http://schemas.microsoft.com/office/drawing/2010/main" xmlns="">
                 <a:solidFill>
                   <a:srgbClr val="FFFFFF"/>
                 </a:solidFill>
@@ -1172,7 +1172,7 @@
           </a:ln>
           <a:extLst>
             <a:ext uri="{909E8E84-426E-40dd-AFC4-6F175D3DCCD1}">
-              <a14:hiddenFill xmlns="" xmlns:a14="http://schemas.microsoft.com/office/drawing/2010/main">
+              <a14:hiddenFill xmlns:a14="http://schemas.microsoft.com/office/drawing/2010/main" xmlns="">
                 <a:solidFill>
                   <a:srgbClr val="FFFFFF"/>
                 </a:solidFill>
@@ -1218,7 +1218,7 @@
           </a:ln>
           <a:extLst>
             <a:ext uri="{909E8E84-426E-40dd-AFC4-6F175D3DCCD1}">
-              <a14:hiddenFill xmlns="" xmlns:a14="http://schemas.microsoft.com/office/drawing/2010/main">
+              <a14:hiddenFill xmlns:a14="http://schemas.microsoft.com/office/drawing/2010/main" xmlns="">
                 <a:solidFill>
                   <a:srgbClr val="FFFFFF"/>
                 </a:solidFill>
@@ -1519,215 +1519,6 @@
           </a:p>
         </p:txBody>
       </p:sp>
-      <p:sp>
-        <p:nvSpPr>
-          <p:cNvPr id="20" name="Subtitle 2">
-            <a:extLst>
-              <a:ext uri="{FF2B5EF4-FFF2-40B4-BE49-F238E27FC236}">
-                <a16:creationId xmlns:a16="http://schemas.microsoft.com/office/drawing/2014/main" id="{FEC5CEB5-FFF5-064D-9948-3644B345D677}"/>
-              </a:ext>
-            </a:extLst>
-          </p:cNvPr>
-          <p:cNvSpPr txBox="1">
-            <a:spLocks/>
-          </p:cNvSpPr>
-          <p:nvPr userDrawn="1"/>
-        </p:nvSpPr>
-        <p:spPr>
-          <a:xfrm>
-            <a:off x="1065706" y="6879009"/>
-            <a:ext cx="10462338" cy="382005"/>
-          </a:xfrm>
-          <a:prstGeom prst="rect">
-            <a:avLst/>
-          </a:prstGeom>
-        </p:spPr>
-        <p:txBody>
-          <a:bodyPr vert="horz" lIns="130048" tIns="65024" rIns="130048" bIns="65024" rtlCol="0" anchor="ctr">
-            <a:normAutofit fontScale="92500" lnSpcReduction="10000"/>
-          </a:bodyPr>
-          <a:lstStyle>
-            <a:lvl1pPr marL="228588" indent="-228588" algn="l" defTabSz="914353" rtl="0" eaLnBrk="1" latinLnBrk="0" hangingPunct="1">
-              <a:lnSpc>
-                <a:spcPct val="90000"/>
-              </a:lnSpc>
-              <a:spcBef>
-                <a:spcPts val="1000"/>
-              </a:spcBef>
-              <a:buFont typeface="Arial" panose="020B0604020202020204" pitchFamily="34" charset="0"/>
-              <a:buChar char="•"/>
-              <a:defRPr sz="2800" kern="1200">
-                <a:solidFill>
-                  <a:schemeClr val="tx1"/>
-                </a:solidFill>
-                <a:latin typeface="Gill Sans MT" panose="020B0502020104020203" pitchFamily="34" charset="0"/>
-                <a:ea typeface="+mn-ea"/>
-                <a:cs typeface="+mn-cs"/>
-              </a:defRPr>
-            </a:lvl1pPr>
-            <a:lvl2pPr marL="685765" indent="-228588" algn="l" defTabSz="914353" rtl="0" eaLnBrk="1" latinLnBrk="0" hangingPunct="1">
-              <a:lnSpc>
-                <a:spcPct val="90000"/>
-              </a:lnSpc>
-              <a:spcBef>
-                <a:spcPts val="500"/>
-              </a:spcBef>
-              <a:buFont typeface="Arial" panose="020B0604020202020204" pitchFamily="34" charset="0"/>
-              <a:buChar char="•"/>
-              <a:defRPr sz="2400" kern="1200">
-                <a:solidFill>
-                  <a:schemeClr val="tx1"/>
-                </a:solidFill>
-                <a:latin typeface="Gill Sans MT" panose="020B0502020104020203" pitchFamily="34" charset="0"/>
-                <a:ea typeface="+mn-ea"/>
-                <a:cs typeface="+mn-cs"/>
-              </a:defRPr>
-            </a:lvl2pPr>
-            <a:lvl3pPr marL="1142942" indent="-228588" algn="l" defTabSz="914353" rtl="0" eaLnBrk="1" latinLnBrk="0" hangingPunct="1">
-              <a:lnSpc>
-                <a:spcPct val="90000"/>
-              </a:lnSpc>
-              <a:spcBef>
-                <a:spcPts val="500"/>
-              </a:spcBef>
-              <a:buFont typeface="Arial" panose="020B0604020202020204" pitchFamily="34" charset="0"/>
-              <a:buChar char="•"/>
-              <a:defRPr sz="2000" kern="1200">
-                <a:solidFill>
-                  <a:schemeClr val="tx1"/>
-                </a:solidFill>
-                <a:latin typeface="Gill Sans MT" panose="020B0502020104020203" pitchFamily="34" charset="0"/>
-                <a:ea typeface="+mn-ea"/>
-                <a:cs typeface="+mn-cs"/>
-              </a:defRPr>
-            </a:lvl3pPr>
-            <a:lvl4pPr marL="1600118" indent="-228588" algn="l" defTabSz="914353" rtl="0" eaLnBrk="1" latinLnBrk="0" hangingPunct="1">
-              <a:lnSpc>
-                <a:spcPct val="90000"/>
-              </a:lnSpc>
-              <a:spcBef>
-                <a:spcPts val="500"/>
-              </a:spcBef>
-              <a:buFont typeface="Arial" panose="020B0604020202020204" pitchFamily="34" charset="0"/>
-              <a:buChar char="•"/>
-              <a:defRPr sz="1800" kern="1200">
-                <a:solidFill>
-                  <a:schemeClr val="tx1"/>
-                </a:solidFill>
-                <a:latin typeface="Gill Sans MT" panose="020B0502020104020203" pitchFamily="34" charset="0"/>
-                <a:ea typeface="+mn-ea"/>
-                <a:cs typeface="+mn-cs"/>
-              </a:defRPr>
-            </a:lvl4pPr>
-            <a:lvl5pPr marL="2057295" indent="-228588" algn="l" defTabSz="914353" rtl="0" eaLnBrk="1" latinLnBrk="0" hangingPunct="1">
-              <a:lnSpc>
-                <a:spcPct val="90000"/>
-              </a:lnSpc>
-              <a:spcBef>
-                <a:spcPts val="500"/>
-              </a:spcBef>
-              <a:buFont typeface="Arial" panose="020B0604020202020204" pitchFamily="34" charset="0"/>
-              <a:buChar char="•"/>
-              <a:defRPr sz="1800" kern="1200">
-                <a:solidFill>
-                  <a:schemeClr val="tx1"/>
-                </a:solidFill>
-                <a:latin typeface="Gill Sans MT" panose="020B0502020104020203" pitchFamily="34" charset="0"/>
-                <a:ea typeface="+mn-ea"/>
-                <a:cs typeface="+mn-cs"/>
-              </a:defRPr>
-            </a:lvl5pPr>
-            <a:lvl6pPr marL="2514471" indent="-228588" algn="l" defTabSz="914353" rtl="0" eaLnBrk="1" latinLnBrk="0" hangingPunct="1">
-              <a:lnSpc>
-                <a:spcPct val="90000"/>
-              </a:lnSpc>
-              <a:spcBef>
-                <a:spcPts val="500"/>
-              </a:spcBef>
-              <a:buFont typeface="Arial" panose="020B0604020202020204" pitchFamily="34" charset="0"/>
-              <a:buChar char="•"/>
-              <a:defRPr sz="1800" kern="1200">
-                <a:solidFill>
-                  <a:schemeClr val="tx1"/>
-                </a:solidFill>
-                <a:latin typeface="+mn-lt"/>
-                <a:ea typeface="+mn-ea"/>
-                <a:cs typeface="+mn-cs"/>
-              </a:defRPr>
-            </a:lvl6pPr>
-            <a:lvl7pPr marL="2971648" indent="-228588" algn="l" defTabSz="914353" rtl="0" eaLnBrk="1" latinLnBrk="0" hangingPunct="1">
-              <a:lnSpc>
-                <a:spcPct val="90000"/>
-              </a:lnSpc>
-              <a:spcBef>
-                <a:spcPts val="500"/>
-              </a:spcBef>
-              <a:buFont typeface="Arial" panose="020B0604020202020204" pitchFamily="34" charset="0"/>
-              <a:buChar char="•"/>
-              <a:defRPr sz="1800" kern="1200">
-                <a:solidFill>
-                  <a:schemeClr val="tx1"/>
-                </a:solidFill>
-                <a:latin typeface="+mn-lt"/>
-                <a:ea typeface="+mn-ea"/>
-                <a:cs typeface="+mn-cs"/>
-              </a:defRPr>
-            </a:lvl7pPr>
-            <a:lvl8pPr marL="3428825" indent="-228588" algn="l" defTabSz="914353" rtl="0" eaLnBrk="1" latinLnBrk="0" hangingPunct="1">
-              <a:lnSpc>
-                <a:spcPct val="90000"/>
-              </a:lnSpc>
-              <a:spcBef>
-                <a:spcPts val="500"/>
-              </a:spcBef>
-              <a:buFont typeface="Arial" panose="020B0604020202020204" pitchFamily="34" charset="0"/>
-              <a:buChar char="•"/>
-              <a:defRPr sz="1800" kern="1200">
-                <a:solidFill>
-                  <a:schemeClr val="tx1"/>
-                </a:solidFill>
-                <a:latin typeface="+mn-lt"/>
-                <a:ea typeface="+mn-ea"/>
-                <a:cs typeface="+mn-cs"/>
-              </a:defRPr>
-            </a:lvl8pPr>
-            <a:lvl9pPr marL="3886001" indent="-228588" algn="l" defTabSz="914353" rtl="0" eaLnBrk="1" latinLnBrk="0" hangingPunct="1">
-              <a:lnSpc>
-                <a:spcPct val="90000"/>
-              </a:lnSpc>
-              <a:spcBef>
-                <a:spcPts val="500"/>
-              </a:spcBef>
-              <a:buFont typeface="Arial" panose="020B0604020202020204" pitchFamily="34" charset="0"/>
-              <a:buChar char="•"/>
-              <a:defRPr sz="1800" kern="1200">
-                <a:solidFill>
-                  <a:schemeClr val="tx1"/>
-                </a:solidFill>
-                <a:latin typeface="+mn-lt"/>
-                <a:ea typeface="+mn-ea"/>
-                <a:cs typeface="+mn-cs"/>
-              </a:defRPr>
-            </a:lvl9pPr>
-          </a:lstStyle>
-          <a:p>
-            <a:pPr marL="0" indent="0">
-              <a:buNone/>
-            </a:pPr>
-            <a:r>
-              <a:rPr lang="en-US" sz="2200" kern="0" baseline="0" dirty="0">
-                <a:solidFill>
-                  <a:schemeClr val="tx1"/>
-                </a:solidFill>
-                <a:latin typeface="Gill Sans MT" panose="020B0502020104020203" pitchFamily="34" charset="0"/>
-                <a:ea typeface="+mn-ea"/>
-                <a:cs typeface="+mn-cs"/>
-              </a:rPr>
-              <a:t>Some slides from Hitesh Raju</a:t>
-            </a:r>
-          </a:p>
-        </p:txBody>
-      </p:sp>
     </p:spTree>
     <p:extLst>
       <p:ext uri="{BB962C8B-B14F-4D97-AF65-F5344CB8AC3E}">
@@ -6896,7 +6687,7 @@
           <a:p>
             <a:fld id="{6E39BF48-6E0A-4E37-BB05-8DF70571673D}" type="datetimeFigureOut">
               <a:rPr lang="en-US" smtClean="0"/>
-              <a:t>7/25/19</a:t>
+              <a:t>8/10/20</a:t>
             </a:fld>
             <a:endParaRPr lang="en-US"/>
           </a:p>
@@ -7873,14 +7664,14 @@
           <a:p>
             <a:pPr lvl="1"/>
             <a:r>
-              <a:rPr lang="en-US" dirty="0"/>
+              <a:rPr lang="en-US" b="1" dirty="0"/>
               <a:t>Everything we do in this class assumes RHC (not in processing)</a:t>
             </a:r>
           </a:p>
           <a:p>
             <a:pPr lvl="1"/>
             <a:r>
-              <a:rPr lang="en-US" dirty="0"/>
+              <a:rPr lang="en-US" b="1" dirty="0"/>
               <a:t>I’ve included some code in the skeleton to convert Processing into a RHC</a:t>
             </a:r>
           </a:p>
@@ -9924,7 +9715,12 @@
             <p:ph sz="half" idx="1"/>
           </p:nvPr>
         </p:nvSpPr>
-        <p:spPr/>
+        <p:spPr>
+          <a:xfrm>
+            <a:off x="3717132" y="1177220"/>
+            <a:ext cx="9905999" cy="7399162"/>
+          </a:xfrm>
+        </p:spPr>
         <p:txBody>
           <a:bodyPr/>
           <a:lstStyle/>
@@ -9938,7 +9734,7 @@
             <a:pPr lvl="1"/>
             <a:r>
               <a:rPr lang="en-US" dirty="0"/>
-              <a:t>More complex shapes available with:</a:t>
+              <a:t>More complex shapes (convex polygons) available with:</a:t>
             </a:r>
           </a:p>
           <a:p>
@@ -14118,15 +13914,7 @@
             <a:pPr algn="ctr"/>
             <a:r>
               <a:rPr lang="en-US" dirty="0"/>
-              <a:t>Built-in </a:t>
-            </a:r>
-            <a:r>
-              <a:rPr lang="en-US" dirty="0" err="1"/>
-              <a:t>Calcuation</a:t>
-            </a:r>
-            <a:r>
-              <a:rPr lang="en-US" dirty="0"/>
-              <a:t> Functions</a:t>
+              <a:t>Built-in Calculation Functions</a:t>
             </a:r>
           </a:p>
           <a:p>
@@ -17380,15 +17168,7 @@
           <a:p>
             <a:r>
               <a:rPr lang="en-US" dirty="0"/>
-              <a:t>why not other </a:t>
-            </a:r>
-            <a:r>
-              <a:rPr lang="en-US" dirty="0" err="1"/>
-              <a:t>languges</a:t>
-            </a:r>
-            <a:r>
-              <a:rPr lang="en-US" dirty="0"/>
-              <a:t>?</a:t>
+              <a:t>why not other languages?</a:t>
             </a:r>
           </a:p>
           <a:p>

</xml_diff>